<commit_message>
Adding history functionality (i.e. a slider and tracking dictionary for current/max iteration) Slider appears when doing first solve, on slider change the graph appears but the slider disappears.
</commit_message>
<xml_diff>
--- a/docs/symbench-studio-layout.pptx
+++ b/docs/symbench-studio-layout.pptx
@@ -262,7 +262,7 @@
           <a:p>
             <a:fld id="{3333D4CF-3B87-8741-A2A1-805F099A5847}" type="datetimeFigureOut">
               <a:rPr lang="en-US" smtClean="0"/>
-              <a:t>8/1/23</a:t>
+              <a:t>8/2/23</a:t>
             </a:fld>
             <a:endParaRPr lang="en-US"/>
           </a:p>
@@ -460,7 +460,7 @@
           <a:p>
             <a:fld id="{3333D4CF-3B87-8741-A2A1-805F099A5847}" type="datetimeFigureOut">
               <a:rPr lang="en-US" smtClean="0"/>
-              <a:t>8/1/23</a:t>
+              <a:t>8/2/23</a:t>
             </a:fld>
             <a:endParaRPr lang="en-US"/>
           </a:p>
@@ -668,7 +668,7 @@
           <a:p>
             <a:fld id="{3333D4CF-3B87-8741-A2A1-805F099A5847}" type="datetimeFigureOut">
               <a:rPr lang="en-US" smtClean="0"/>
-              <a:t>8/1/23</a:t>
+              <a:t>8/2/23</a:t>
             </a:fld>
             <a:endParaRPr lang="en-US"/>
           </a:p>
@@ -866,7 +866,7 @@
           <a:p>
             <a:fld id="{3333D4CF-3B87-8741-A2A1-805F099A5847}" type="datetimeFigureOut">
               <a:rPr lang="en-US" smtClean="0"/>
-              <a:t>8/1/23</a:t>
+              <a:t>8/2/23</a:t>
             </a:fld>
             <a:endParaRPr lang="en-US"/>
           </a:p>
@@ -1141,7 +1141,7 @@
           <a:p>
             <a:fld id="{3333D4CF-3B87-8741-A2A1-805F099A5847}" type="datetimeFigureOut">
               <a:rPr lang="en-US" smtClean="0"/>
-              <a:t>8/1/23</a:t>
+              <a:t>8/2/23</a:t>
             </a:fld>
             <a:endParaRPr lang="en-US"/>
           </a:p>
@@ -1406,7 +1406,7 @@
           <a:p>
             <a:fld id="{3333D4CF-3B87-8741-A2A1-805F099A5847}" type="datetimeFigureOut">
               <a:rPr lang="en-US" smtClean="0"/>
-              <a:t>8/1/23</a:t>
+              <a:t>8/2/23</a:t>
             </a:fld>
             <a:endParaRPr lang="en-US"/>
           </a:p>
@@ -1818,7 +1818,7 @@
           <a:p>
             <a:fld id="{3333D4CF-3B87-8741-A2A1-805F099A5847}" type="datetimeFigureOut">
               <a:rPr lang="en-US" smtClean="0"/>
-              <a:t>8/1/23</a:t>
+              <a:t>8/2/23</a:t>
             </a:fld>
             <a:endParaRPr lang="en-US"/>
           </a:p>
@@ -1959,7 +1959,7 @@
           <a:p>
             <a:fld id="{3333D4CF-3B87-8741-A2A1-805F099A5847}" type="datetimeFigureOut">
               <a:rPr lang="en-US" smtClean="0"/>
-              <a:t>8/1/23</a:t>
+              <a:t>8/2/23</a:t>
             </a:fld>
             <a:endParaRPr lang="en-US"/>
           </a:p>
@@ -2072,7 +2072,7 @@
           <a:p>
             <a:fld id="{3333D4CF-3B87-8741-A2A1-805F099A5847}" type="datetimeFigureOut">
               <a:rPr lang="en-US" smtClean="0"/>
-              <a:t>8/1/23</a:t>
+              <a:t>8/2/23</a:t>
             </a:fld>
             <a:endParaRPr lang="en-US"/>
           </a:p>
@@ -2383,7 +2383,7 @@
           <a:p>
             <a:fld id="{3333D4CF-3B87-8741-A2A1-805F099A5847}" type="datetimeFigureOut">
               <a:rPr lang="en-US" smtClean="0"/>
-              <a:t>8/1/23</a:t>
+              <a:t>8/2/23</a:t>
             </a:fld>
             <a:endParaRPr lang="en-US"/>
           </a:p>
@@ -2671,7 +2671,7 @@
           <a:p>
             <a:fld id="{3333D4CF-3B87-8741-A2A1-805F099A5847}" type="datetimeFigureOut">
               <a:rPr lang="en-US" smtClean="0"/>
-              <a:t>8/1/23</a:t>
+              <a:t>8/2/23</a:t>
             </a:fld>
             <a:endParaRPr lang="en-US"/>
           </a:p>
@@ -2912,7 +2912,7 @@
           <a:p>
             <a:fld id="{3333D4CF-3B87-8741-A2A1-805F099A5847}" type="datetimeFigureOut">
               <a:rPr lang="en-US" smtClean="0"/>
-              <a:t>8/1/23</a:t>
+              <a:t>8/2/23</a:t>
             </a:fld>
             <a:endParaRPr lang="en-US"/>
           </a:p>
@@ -6452,7 +6452,7 @@
         <p:spPr>
           <a:xfrm>
             <a:off x="3322458" y="3044855"/>
-            <a:ext cx="5562838" cy="3333395"/>
+            <a:ext cx="5562838" cy="1907413"/>
           </a:xfrm>
           <a:prstGeom prst="roundRect">
             <a:avLst/>
@@ -7089,7 +7089,7 @@
         <p:spPr>
           <a:xfrm>
             <a:off x="3467156" y="5046078"/>
-            <a:ext cx="5222104" cy="1219252"/>
+            <a:ext cx="5222104" cy="1309572"/>
           </a:xfrm>
           <a:prstGeom prst="roundRect">
             <a:avLst/>
@@ -7120,6 +7120,46 @@
               <a:t>Pareto Graph (all solvers/configs)</a:t>
             </a:r>
           </a:p>
+        </p:txBody>
+      </p:sp>
+      <p:sp>
+        <p:nvSpPr>
+          <p:cNvPr id="7" name="Rounded Rectangle 6">
+            <a:extLst>
+              <a:ext uri="{FF2B5EF4-FFF2-40B4-BE49-F238E27FC236}">
+                <a16:creationId xmlns:a16="http://schemas.microsoft.com/office/drawing/2014/main" id="{04260597-43CB-7FAD-A4AC-FA18804C33C7}"/>
+              </a:ext>
+            </a:extLst>
+          </p:cNvPr>
+          <p:cNvSpPr/>
+          <p:nvPr/>
+        </p:nvSpPr>
+        <p:spPr>
+          <a:xfrm>
+            <a:off x="4098301" y="5471736"/>
+            <a:ext cx="3836831" cy="883914"/>
+          </a:xfrm>
+          <a:prstGeom prst="roundRect">
+            <a:avLst/>
+          </a:prstGeom>
+        </p:spPr>
+        <p:style>
+          <a:lnRef idx="2">
+            <a:schemeClr val="accent6"/>
+          </a:lnRef>
+          <a:fillRef idx="1">
+            <a:schemeClr val="lt1"/>
+          </a:fillRef>
+          <a:effectRef idx="0">
+            <a:schemeClr val="accent6"/>
+          </a:effectRef>
+          <a:fontRef idx="minor">
+            <a:schemeClr val="dk1"/>
+          </a:fontRef>
+        </p:style>
+        <p:txBody>
+          <a:bodyPr rtlCol="0" anchor="ctr"/>
+          <a:lstStyle/>
           <a:p>
             <a:pPr algn="ctr"/>
             <a:r>
@@ -7133,6 +7173,132 @@
           </a:p>
         </p:txBody>
       </p:sp>
+      <p:sp>
+        <p:nvSpPr>
+          <p:cNvPr id="8" name="Rounded Rectangle 7">
+            <a:extLst>
+              <a:ext uri="{FF2B5EF4-FFF2-40B4-BE49-F238E27FC236}">
+                <a16:creationId xmlns:a16="http://schemas.microsoft.com/office/drawing/2014/main" id="{74B115D5-EA2C-3CCF-8E98-9D865B3F068A}"/>
+              </a:ext>
+            </a:extLst>
+          </p:cNvPr>
+          <p:cNvSpPr/>
+          <p:nvPr/>
+        </p:nvSpPr>
+        <p:spPr>
+          <a:xfrm>
+            <a:off x="5187936" y="6427436"/>
+            <a:ext cx="1747157" cy="161185"/>
+          </a:xfrm>
+          <a:prstGeom prst="roundRect">
+            <a:avLst/>
+          </a:prstGeom>
+        </p:spPr>
+        <p:style>
+          <a:lnRef idx="2">
+            <a:schemeClr val="accent6"/>
+          </a:lnRef>
+          <a:fillRef idx="1">
+            <a:schemeClr val="lt1"/>
+          </a:fillRef>
+          <a:effectRef idx="0">
+            <a:schemeClr val="accent6"/>
+          </a:effectRef>
+          <a:fontRef idx="minor">
+            <a:schemeClr val="dk1"/>
+          </a:fontRef>
+        </p:style>
+        <p:txBody>
+          <a:bodyPr rtlCol="0" anchor="ctr"/>
+          <a:lstStyle/>
+          <a:p>
+            <a:pPr algn="ctr"/>
+            <a:r>
+              <a:rPr lang="en-US" dirty="0"/>
+              <a:t>slider</a:t>
+            </a:r>
+          </a:p>
+        </p:txBody>
+      </p:sp>
+      <p:sp>
+        <p:nvSpPr>
+          <p:cNvPr id="10" name="TextBox 9">
+            <a:extLst>
+              <a:ext uri="{FF2B5EF4-FFF2-40B4-BE49-F238E27FC236}">
+                <a16:creationId xmlns:a16="http://schemas.microsoft.com/office/drawing/2014/main" id="{20C75CE1-FA26-406D-6B6C-86B8CC425CD0}"/>
+              </a:ext>
+            </a:extLst>
+          </p:cNvPr>
+          <p:cNvSpPr txBox="1"/>
+          <p:nvPr/>
+        </p:nvSpPr>
+        <p:spPr>
+          <a:xfrm>
+            <a:off x="8849845" y="6385754"/>
+            <a:ext cx="3352071" cy="369332"/>
+          </a:xfrm>
+          <a:prstGeom prst="rect">
+            <a:avLst/>
+          </a:prstGeom>
+          <a:noFill/>
+        </p:spPr>
+        <p:txBody>
+          <a:bodyPr wrap="none" rtlCol="0">
+            <a:spAutoFit/>
+          </a:bodyPr>
+          <a:lstStyle/>
+          <a:p>
+            <a:r>
+              <a:rPr lang="en-US" dirty="0" err="1"/>
+              <a:t>st.session_state.display_num_iter</a:t>
+            </a:r>
+            <a:endParaRPr lang="en-US" dirty="0"/>
+          </a:p>
+        </p:txBody>
+      </p:sp>
+      <p:cxnSp>
+        <p:nvCxnSpPr>
+          <p:cNvPr id="14" name="Straight Arrow Connector 13">
+            <a:extLst>
+              <a:ext uri="{FF2B5EF4-FFF2-40B4-BE49-F238E27FC236}">
+                <a16:creationId xmlns:a16="http://schemas.microsoft.com/office/drawing/2014/main" id="{C95B530E-3155-D33B-8411-7A86906E5104}"/>
+              </a:ext>
+            </a:extLst>
+          </p:cNvPr>
+          <p:cNvCxnSpPr>
+            <a:cxnSpLocks/>
+            <a:stCxn id="10" idx="1"/>
+            <a:endCxn id="8" idx="3"/>
+          </p:cNvCxnSpPr>
+          <p:nvPr/>
+        </p:nvCxnSpPr>
+        <p:spPr>
+          <a:xfrm flipH="1" flipV="1">
+            <a:off x="6935093" y="6508029"/>
+            <a:ext cx="1914752" cy="62391"/>
+          </a:xfrm>
+          <a:prstGeom prst="straightConnector1">
+            <a:avLst/>
+          </a:prstGeom>
+          <a:ln>
+            <a:tailEnd type="triangle"/>
+          </a:ln>
+        </p:spPr>
+        <p:style>
+          <a:lnRef idx="1">
+            <a:schemeClr val="accent1"/>
+          </a:lnRef>
+          <a:fillRef idx="0">
+            <a:schemeClr val="accent1"/>
+          </a:fillRef>
+          <a:effectRef idx="0">
+            <a:schemeClr val="accent1"/>
+          </a:effectRef>
+          <a:fontRef idx="minor">
+            <a:schemeClr val="tx1"/>
+          </a:fontRef>
+        </p:style>
+      </p:cxnSp>
     </p:spTree>
     <p:extLst>
       <p:ext uri="{BB962C8B-B14F-4D97-AF65-F5344CB8AC3E}">

</xml_diff>